<commit_message>
La till ett par slides
</commit_message>
<xml_diff>
--- a/Lärande om lärande.pptx
+++ b/Lärande om lärande.pptx
@@ -5,7 +5,7 @@
     <p:sldMasterId id="2147483648" r:id="rId1"/>
   </p:sldMasterIdLst>
   <p:notesMasterIdLst>
-    <p:notesMasterId r:id="rId27"/>
+    <p:notesMasterId r:id="rId29"/>
   </p:notesMasterIdLst>
   <p:sldIdLst>
     <p:sldId id="256" r:id="rId2"/>
@@ -17,22 +17,24 @@
     <p:sldId id="260" r:id="rId8"/>
     <p:sldId id="277" r:id="rId9"/>
     <p:sldId id="274" r:id="rId10"/>
-    <p:sldId id="280" r:id="rId11"/>
-    <p:sldId id="262" r:id="rId12"/>
-    <p:sldId id="269" r:id="rId13"/>
-    <p:sldId id="265" r:id="rId14"/>
-    <p:sldId id="278" r:id="rId15"/>
-    <p:sldId id="279" r:id="rId16"/>
-    <p:sldId id="270" r:id="rId17"/>
-    <p:sldId id="271" r:id="rId18"/>
-    <p:sldId id="272" r:id="rId19"/>
-    <p:sldId id="261" r:id="rId20"/>
-    <p:sldId id="273" r:id="rId21"/>
-    <p:sldId id="264" r:id="rId22"/>
-    <p:sldId id="266" r:id="rId23"/>
-    <p:sldId id="267" r:id="rId24"/>
-    <p:sldId id="263" r:id="rId25"/>
-    <p:sldId id="268" r:id="rId26"/>
+    <p:sldId id="281" r:id="rId11"/>
+    <p:sldId id="282" r:id="rId12"/>
+    <p:sldId id="280" r:id="rId13"/>
+    <p:sldId id="262" r:id="rId14"/>
+    <p:sldId id="269" r:id="rId15"/>
+    <p:sldId id="265" r:id="rId16"/>
+    <p:sldId id="278" r:id="rId17"/>
+    <p:sldId id="279" r:id="rId18"/>
+    <p:sldId id="270" r:id="rId19"/>
+    <p:sldId id="271" r:id="rId20"/>
+    <p:sldId id="272" r:id="rId21"/>
+    <p:sldId id="261" r:id="rId22"/>
+    <p:sldId id="273" r:id="rId23"/>
+    <p:sldId id="264" r:id="rId24"/>
+    <p:sldId id="266" r:id="rId25"/>
+    <p:sldId id="267" r:id="rId26"/>
+    <p:sldId id="263" r:id="rId27"/>
+    <p:sldId id="268" r:id="rId28"/>
   </p:sldIdLst>
   <p:sldSz cx="12192000" cy="6858000"/>
   <p:notesSz cx="6858000" cy="9144000"/>
@@ -137,6 +139,10 @@
     </p:ext>
   </p:extLst>
 </p:presentation>
+</file>
+
+<file path=ppt/revisionInfo.xml><?xml version="1.0" encoding="utf-8"?>
+<p1510:revInfo xmlns:a="http://schemas.openxmlformats.org/drawingml/2006/main" xmlns:r="http://schemas.openxmlformats.org/officeDocument/2006/relationships" xmlns:p1510="http://schemas.microsoft.com/office/powerpoint/2015/10/main"/>
 </file>
 
 <file path=ppt/notesMasters/notesMaster1.xml><?xml version="1.0" encoding="utf-8"?>
@@ -607,7 +613,7 @@
       </p:grpSpPr>
       <p:sp>
         <p:nvSpPr>
-          <p:cNvPr id="2" name="Slide Image Placeholder 1"/>
+          <p:cNvPr id="2" name="Platshållare för bildobjekt 1"/>
           <p:cNvSpPr>
             <a:spLocks noGrp="1" noRot="1" noChangeAspect="1"/>
           </p:cNvSpPr>
@@ -619,7 +625,7 @@
       </p:sp>
       <p:sp>
         <p:nvSpPr>
-          <p:cNvPr id="3" name="Notes Placeholder 2"/>
+          <p:cNvPr id="3" name="Platshållare för anteckningar 2"/>
           <p:cNvSpPr>
             <a:spLocks noGrp="1"/>
           </p:cNvSpPr>
@@ -632,45 +638,13 @@
           <a:bodyPr/>
           <a:lstStyle/>
           <a:p>
-            <a:r>
-              <a:rPr lang="sv-SE" dirty="0"/>
-              <a:t>Jamen</a:t>
-            </a:r>
-            <a:r>
-              <a:rPr lang="sv-SE" baseline="0" dirty="0"/>
-              <a:t> då så. Stressa inte. Bra, då var det klart, då kan vi gå hem... Så klart en sån där sak som är lätt att säga och svårare att göra. </a:t>
-            </a:r>
-          </a:p>
-          <a:p>
-            <a:r>
-              <a:rPr lang="sv-SE" baseline="0" dirty="0"/>
-              <a:t>Det finns ingen silver bullet-lösning mot stress, det handlar om hur man läggar upp sitt liv, eller i värsta fall hur andra lägger upp ens liv åt en. </a:t>
-            </a:r>
-          </a:p>
-          <a:p>
-            <a:endParaRPr lang="sv-SE" baseline="0" dirty="0"/>
-          </a:p>
-          <a:p>
-            <a:r>
-              <a:rPr lang="sv-SE" baseline="0" dirty="0"/>
-              <a:t>Ändra vanor kan vara svårt, det finns folk som går i KBT-terapi i många år för att försöka ändra på sina grundläggande vanor. </a:t>
-            </a:r>
-          </a:p>
-          <a:p>
-            <a:endParaRPr lang="sv-SE" baseline="0" dirty="0"/>
-          </a:p>
-          <a:p>
-            <a:r>
-              <a:rPr lang="sv-SE" baseline="0" dirty="0"/>
-              <a:t>Men om man ska tänka på stress i förhållande till lärande kan man säga att det finns några vanor man kan lägga sig till med eller bara sätt att tänka som kanske kan vara hjälpsamt.</a:t>
-            </a:r>
             <a:endParaRPr lang="sv-SE" dirty="0"/>
           </a:p>
         </p:txBody>
       </p:sp>
       <p:sp>
         <p:nvSpPr>
-          <p:cNvPr id="4" name="Slide Number Placeholder 3"/>
+          <p:cNvPr id="4" name="Platshållare för bildnummer 3"/>
           <p:cNvSpPr>
             <a:spLocks noGrp="1"/>
           </p:cNvSpPr>
@@ -685,7 +659,7 @@
           <a:p>
             <a:fld id="{3C85722A-B490-4F7B-A61D-AA19F38B2928}" type="slidenum">
               <a:rPr lang="sv-SE" smtClean="0"/>
-              <a:t>19</a:t>
+              <a:t>12</a:t>
             </a:fld>
             <a:endParaRPr lang="sv-SE"/>
           </a:p>
@@ -694,7 +668,7 @@
     </p:spTree>
     <p:extLst>
       <p:ext uri="{BB962C8B-B14F-4D97-AF65-F5344CB8AC3E}">
-        <p14:creationId xmlns:p14="http://schemas.microsoft.com/office/powerpoint/2010/main" val="3030325868"/>
+        <p14:creationId xmlns:p14="http://schemas.microsoft.com/office/powerpoint/2010/main" val="3663503193"/>
       </p:ext>
     </p:extLst>
   </p:cSld>
@@ -749,100 +723,61 @@
           <a:lstStyle/>
           <a:p>
             <a:r>
-              <a:rPr lang="sv-SE" baseline="0"/>
-              <a:t>I skolan pratade de ibland om ett livslångt lärande. Det tog ganska många år</a:t>
-            </a:r>
-            <a:br>
-              <a:rPr lang="sv-SE" baseline="0"/>
-            </a:br>
-            <a:r>
-              <a:rPr lang="sv-SE" baseline="0"/>
-              <a:t>innan den poletten trillade ned för mig.</a:t>
-            </a:r>
-            <a:endParaRPr lang="sv-SE"/>
-          </a:p>
-          <a:p>
-            <a:endParaRPr lang="sv-SE"/>
-          </a:p>
-          <a:p>
-            <a:r>
-              <a:rPr lang="sv-SE"/>
-              <a:t>Lärande </a:t>
-            </a:r>
-            <a:r>
               <a:rPr lang="sv-SE" dirty="0"/>
-              <a:t>är en process som pågår hela livet. Det</a:t>
+              <a:t>Krävs det ett helt tyst rum i en fin miljö?</a:t>
+            </a:r>
+          </a:p>
+          <a:p>
+            <a:endParaRPr lang="sv-SE" dirty="0"/>
+          </a:p>
+          <a:p>
+            <a:r>
+              <a:rPr lang="sv-SE" dirty="0"/>
+              <a:t>Lugn och ro är något man bär med sig.</a:t>
             </a:r>
             <a:r>
               <a:rPr lang="sv-SE" baseline="0" dirty="0"/>
-              <a:t> kanske är lättare att se på oss som väkdigt kunskapsinriktade jobb, men det gäller så klart alla människor.</a:t>
+              <a:t> Kopplat till välmående. Det finns viss forskning som påstår att människor som känner att de mår bra och är balanserade eller glada över något blir smartare, vad nu det betyder.</a:t>
             </a:r>
           </a:p>
           <a:p>
             <a:r>
               <a:rPr lang="sv-SE" baseline="0" dirty="0"/>
-              <a:t>(En lågstadielärare som precis ska gå i pension har förmodligen jobbat upp en rutin på hur barn i åldern 7-9 funkar som närmar sig telepati.) -&gt; rutin </a:t>
-            </a:r>
-          </a:p>
-          <a:p>
-            <a:endParaRPr lang="sv-SE" baseline="0" dirty="0"/>
-          </a:p>
-          <a:p>
+              <a:t>Det är inte så konstigt, den som känner sig hoppfull tenderar att försöka lite längre innan den ger upp och ha lättare för att hitta lösningar när saker går åt pipan.</a:t>
+            </a:r>
+            <a:endParaRPr lang="sv-SE" dirty="0"/>
+          </a:p>
+          <a:p>
+            <a:endParaRPr lang="sv-SE" dirty="0"/>
+          </a:p>
+          <a:p>
+            <a:r>
+              <a:rPr lang="sv-SE" dirty="0"/>
+              <a:t>Tankar kommer hoppande och skuttande hela tiden – ta en paus. Vilorum finns. Stäng in dig i mörkret i fem minuter och tänk på ingenting.</a:t>
+            </a:r>
+          </a:p>
+          <a:p>
+            <a:endParaRPr lang="sv-SE" dirty="0"/>
+          </a:p>
+          <a:p>
+            <a:r>
+              <a:rPr lang="sv-SE" dirty="0"/>
+              <a:t>Blir du tokstressad? Kanske dags för meditationsapp. Inte bara för att blir effektivare, bättre, lära sig snabbare...</a:t>
+            </a:r>
             <a:r>
               <a:rPr lang="sv-SE" baseline="0" dirty="0"/>
-              <a:t>När jag lär mig ett språk kan jag inte säga, okej jag ska kunna tyska om två veckor eller sex månader eller ett år. Faktum är att jag har hållit på med just tyska on and of ungefär sen jag var tjugo. </a:t>
-            </a:r>
-          </a:p>
-          <a:p>
-            <a:r>
-              <a:rPr lang="sv-SE" baseline="0" dirty="0"/>
-              <a:t>Italienska tog mig ungefär sex månader att greppa upp till ungefär samma basicnivå. Det är okej. Jag har ingen deadline. Det handlar om hur jag har gjort och när jag har lagt in lite energi. </a:t>
-            </a:r>
-          </a:p>
-          <a:p>
-            <a:r>
-              <a:rPr lang="sv-SE" baseline="0" dirty="0"/>
-              <a:t>Förmodligen var jag jättemycket mer pepp på italienska än tyska.</a:t>
-            </a:r>
-          </a:p>
-          <a:p>
-            <a:endParaRPr lang="sv-SE" baseline="0" dirty="0"/>
-          </a:p>
-          <a:p>
-            <a:r>
-              <a:rPr lang="sv-SE" baseline="0" dirty="0"/>
-              <a:t>Att lära sig skills som hör till jobbet måste få ske på ungefär samma sätt. Ibland har man deadlines, då får man tillåta sig att slösa kognitiv energi. Ibland vill man bara upprätthålla någon sorts nivå,</a:t>
-            </a:r>
-          </a:p>
-          <a:p>
-            <a:r>
-              <a:rPr lang="sv-SE" baseline="0" dirty="0"/>
-              <a:t>Då kan man lägga en mindre mängd kognitiv energi. Man behöver inte kunna allt nu, för det går ändå inte.</a:t>
-            </a:r>
-          </a:p>
-          <a:p>
-            <a:endParaRPr lang="sv-SE" baseline="0" dirty="0"/>
-          </a:p>
-          <a:p>
-            <a:r>
-              <a:rPr lang="sv-SE" baseline="0" dirty="0"/>
-              <a:t>Sova på saken</a:t>
-            </a:r>
-          </a:p>
-          <a:p>
-            <a:r>
-              <a:rPr lang="sv-SE" baseline="0" dirty="0"/>
-              <a:t>Det finns en anledning till att man säger så. (Det här säger Kathy Sierra också). Hjärnan är superbra på patternmatching. Den gör det även om vi inte ber den om det. Men vi måste ge den resurser i form av</a:t>
-            </a:r>
-          </a:p>
-          <a:p>
-            <a:r>
-              <a:rPr lang="sv-SE" baseline="0" dirty="0"/>
-              <a:t>Tid ocg vila för att hinna med. Därför -&gt; tyst rum. Meditationsapp. Eller faktiskt, vänta tills imorgon och se om hjärnan spottar ur sig en lösning när du sitter på pendeln imorgon bitti. (mindre troligt om du inte spelar mobilspel. Stjäl tyvärr kognitiva resurser och tröttar ut hjärnan...)</a:t>
-            </a:r>
-          </a:p>
-          <a:p>
-            <a:endParaRPr lang="sv-SE" baseline="0" dirty="0"/>
+              <a:t> Vill ju att ni ska må bra </a:t>
+            </a:r>
+            <a:r>
+              <a:rPr lang="sv-SE" baseline="0" dirty="0">
+                <a:sym typeface="Wingdings" panose="05000000000000000000" pitchFamily="2" charset="2"/>
+              </a:rPr>
+              <a:t></a:t>
+            </a:r>
+            <a:endParaRPr lang="sv-SE" dirty="0"/>
+          </a:p>
+          <a:p>
+            <a:endParaRPr lang="sv-SE" dirty="0"/>
           </a:p>
         </p:txBody>
       </p:sp>
@@ -872,7 +807,7 @@
     </p:spTree>
     <p:extLst>
       <p:ext uri="{BB962C8B-B14F-4D97-AF65-F5344CB8AC3E}">
-        <p14:creationId xmlns:p14="http://schemas.microsoft.com/office/powerpoint/2010/main" val="3164428239"/>
+        <p14:creationId xmlns:p14="http://schemas.microsoft.com/office/powerpoint/2010/main" val="3006356964"/>
       </p:ext>
     </p:extLst>
   </p:cSld>
@@ -928,26 +863,37 @@
           <a:p>
             <a:r>
               <a:rPr lang="sv-SE" dirty="0"/>
-              <a:t>Anteckna medan man läser</a:t>
-            </a:r>
-          </a:p>
-          <a:p>
-            <a:r>
-              <a:rPr lang="sv-SE" dirty="0"/>
-              <a:t>Visuellt/audiovisuellt lärande</a:t>
-            </a:r>
-          </a:p>
-          <a:p>
+              <a:t>Jamen</a:t>
+            </a:r>
+            <a:r>
+              <a:rPr lang="sv-SE" baseline="0" dirty="0"/>
+              <a:t> då så. Stressa inte. Bra, då var det klart, då kan vi gå hem... Så klart en sån där sak som är lätt att säga och svårare att göra. </a:t>
+            </a:r>
+          </a:p>
+          <a:p>
+            <a:r>
+              <a:rPr lang="sv-SE" baseline="0" dirty="0"/>
+              <a:t>Det finns ingen silver bullet-lösning mot stress, det handlar om hur man läggar upp sitt liv, eller i värsta fall hur andra lägger upp ens liv åt en. </a:t>
+            </a:r>
+          </a:p>
+          <a:p>
+            <a:endParaRPr lang="sv-SE" baseline="0" dirty="0"/>
+          </a:p>
+          <a:p>
+            <a:r>
+              <a:rPr lang="sv-SE" baseline="0" dirty="0"/>
+              <a:t>Ändra vanor kan vara svårt, det finns folk som går i KBT-terapi i många år för att försöka ändra på sina grundläggande vanor. </a:t>
+            </a:r>
+          </a:p>
+          <a:p>
+            <a:endParaRPr lang="sv-SE" baseline="0" dirty="0"/>
+          </a:p>
+          <a:p>
+            <a:r>
+              <a:rPr lang="sv-SE" baseline="0" dirty="0"/>
+              <a:t>Men om man ska tänka på stress i förhållande till lärande kan man säga att det finns några vanor man kan lägga sig till med eller bara sätt att tänka som kanske kan vara hjälpsamt.</a:t>
+            </a:r>
             <a:endParaRPr lang="sv-SE" dirty="0"/>
-          </a:p>
-          <a:p>
-            <a:endParaRPr lang="sv-SE" dirty="0"/>
-          </a:p>
-          <a:p>
-            <a:r>
-              <a:rPr lang="sv-SE" dirty="0"/>
-              <a:t>Många facetter!</a:t>
-            </a:r>
           </a:p>
         </p:txBody>
       </p:sp>
@@ -968,7 +914,290 @@
           <a:p>
             <a:fld id="{3C85722A-B490-4F7B-A61D-AA19F38B2928}" type="slidenum">
               <a:rPr lang="sv-SE" smtClean="0"/>
-              <a:t>24</a:t>
+              <a:t>21</a:t>
+            </a:fld>
+            <a:endParaRPr lang="sv-SE"/>
+          </a:p>
+        </p:txBody>
+      </p:sp>
+    </p:spTree>
+    <p:extLst>
+      <p:ext uri="{BB962C8B-B14F-4D97-AF65-F5344CB8AC3E}">
+        <p14:creationId xmlns:p14="http://schemas.microsoft.com/office/powerpoint/2010/main" val="3030325868"/>
+      </p:ext>
+    </p:extLst>
+  </p:cSld>
+  <p:clrMapOvr>
+    <a:masterClrMapping/>
+  </p:clrMapOvr>
+</p:notes>
+</file>
+
+<file path=ppt/notesSlides/notesSlide13.xml><?xml version="1.0" encoding="utf-8"?>
+<p:notes xmlns:a="http://schemas.openxmlformats.org/drawingml/2006/main" xmlns:r="http://schemas.openxmlformats.org/officeDocument/2006/relationships" xmlns:p="http://schemas.openxmlformats.org/presentationml/2006/main">
+  <p:cSld>
+    <p:spTree>
+      <p:nvGrpSpPr>
+        <p:cNvPr id="1" name=""/>
+        <p:cNvGrpSpPr/>
+        <p:nvPr/>
+      </p:nvGrpSpPr>
+      <p:grpSpPr>
+        <a:xfrm>
+          <a:off x="0" y="0"/>
+          <a:ext cx="0" cy="0"/>
+          <a:chOff x="0" y="0"/>
+          <a:chExt cx="0" cy="0"/>
+        </a:xfrm>
+      </p:grpSpPr>
+      <p:sp>
+        <p:nvSpPr>
+          <p:cNvPr id="2" name="Slide Image Placeholder 1"/>
+          <p:cNvSpPr>
+            <a:spLocks noGrp="1" noRot="1" noChangeAspect="1"/>
+          </p:cNvSpPr>
+          <p:nvPr>
+            <p:ph type="sldImg"/>
+          </p:nvPr>
+        </p:nvSpPr>
+        <p:spPr/>
+      </p:sp>
+      <p:sp>
+        <p:nvSpPr>
+          <p:cNvPr id="3" name="Notes Placeholder 2"/>
+          <p:cNvSpPr>
+            <a:spLocks noGrp="1"/>
+          </p:cNvSpPr>
+          <p:nvPr>
+            <p:ph type="body" idx="1"/>
+          </p:nvPr>
+        </p:nvSpPr>
+        <p:spPr/>
+        <p:txBody>
+          <a:bodyPr/>
+          <a:lstStyle/>
+          <a:p>
+            <a:r>
+              <a:rPr lang="sv-SE" baseline="0"/>
+              <a:t>I skolan pratade de ibland om ett livslångt lärande. Det tog ganska många år</a:t>
+            </a:r>
+            <a:br>
+              <a:rPr lang="sv-SE" baseline="0"/>
+            </a:br>
+            <a:r>
+              <a:rPr lang="sv-SE" baseline="0"/>
+              <a:t>innan den poletten trillade ned för mig.</a:t>
+            </a:r>
+            <a:endParaRPr lang="sv-SE"/>
+          </a:p>
+          <a:p>
+            <a:endParaRPr lang="sv-SE"/>
+          </a:p>
+          <a:p>
+            <a:r>
+              <a:rPr lang="sv-SE"/>
+              <a:t>Lärande </a:t>
+            </a:r>
+            <a:r>
+              <a:rPr lang="sv-SE" dirty="0"/>
+              <a:t>är en process som pågår hela livet. Det</a:t>
+            </a:r>
+            <a:r>
+              <a:rPr lang="sv-SE" baseline="0" dirty="0"/>
+              <a:t> kanske är lättare att se på oss som väkdigt kunskapsinriktade jobb, men det gäller så klart alla människor.</a:t>
+            </a:r>
+          </a:p>
+          <a:p>
+            <a:r>
+              <a:rPr lang="sv-SE" baseline="0" dirty="0"/>
+              <a:t>(En lågstadielärare som precis ska gå i pension har förmodligen jobbat upp en rutin på hur barn i åldern 7-9 funkar som närmar sig telepati.) -&gt; rutin </a:t>
+            </a:r>
+          </a:p>
+          <a:p>
+            <a:endParaRPr lang="sv-SE" baseline="0" dirty="0"/>
+          </a:p>
+          <a:p>
+            <a:r>
+              <a:rPr lang="sv-SE" baseline="0" dirty="0"/>
+              <a:t>När jag lär mig ett språk kan jag inte säga, okej jag ska kunna tyska om två veckor eller sex månader eller ett år. Faktum är att jag har hållit på med just tyska on and of ungefär sen jag var tjugo. </a:t>
+            </a:r>
+          </a:p>
+          <a:p>
+            <a:r>
+              <a:rPr lang="sv-SE" baseline="0" dirty="0"/>
+              <a:t>Italienska tog mig ungefär sex månader att greppa upp till ungefär samma basicnivå. Det är okej. Jag har ingen deadline. Det handlar om hur jag har gjort och när jag har lagt in lite energi. </a:t>
+            </a:r>
+          </a:p>
+          <a:p>
+            <a:r>
+              <a:rPr lang="sv-SE" baseline="0" dirty="0"/>
+              <a:t>Förmodligen var jag jättemycket mer pepp på italienska än tyska.</a:t>
+            </a:r>
+          </a:p>
+          <a:p>
+            <a:endParaRPr lang="sv-SE" baseline="0" dirty="0"/>
+          </a:p>
+          <a:p>
+            <a:r>
+              <a:rPr lang="sv-SE" baseline="0" dirty="0"/>
+              <a:t>Att lära sig skills som hör till jobbet måste få ske på ungefär samma sätt. Ibland har man deadlines, då får man tillåta sig att slösa kognitiv energi. Ibland vill man bara upprätthålla någon sorts nivå,</a:t>
+            </a:r>
+          </a:p>
+          <a:p>
+            <a:r>
+              <a:rPr lang="sv-SE" baseline="0" dirty="0"/>
+              <a:t>Då kan man lägga en mindre mängd kognitiv energi. Man behöver inte kunna allt nu, för det går ändå inte.</a:t>
+            </a:r>
+          </a:p>
+          <a:p>
+            <a:endParaRPr lang="sv-SE" baseline="0" dirty="0"/>
+          </a:p>
+          <a:p>
+            <a:r>
+              <a:rPr lang="sv-SE" baseline="0" dirty="0"/>
+              <a:t>Sova på saken</a:t>
+            </a:r>
+          </a:p>
+          <a:p>
+            <a:r>
+              <a:rPr lang="sv-SE" baseline="0" dirty="0"/>
+              <a:t>Det finns en anledning till att man säger så. (Det här säger Kathy Sierra också). Hjärnan är superbra på patternmatching. Den gör det även om vi inte ber den om det. Men vi måste ge den resurser i form av</a:t>
+            </a:r>
+          </a:p>
+          <a:p>
+            <a:r>
+              <a:rPr lang="sv-SE" baseline="0" dirty="0"/>
+              <a:t>Tid ocg vila för att hinna med. Därför -&gt; tyst rum. Meditationsapp. Eller faktiskt, vänta tills imorgon och se om hjärnan spottar ur sig en lösning när du sitter på pendeln imorgon bitti. (mindre troligt om du inte spelar mobilspel. Stjäl tyvärr kognitiva resurser och tröttar ut hjärnan...)</a:t>
+            </a:r>
+          </a:p>
+          <a:p>
+            <a:endParaRPr lang="sv-SE" baseline="0" dirty="0"/>
+          </a:p>
+        </p:txBody>
+      </p:sp>
+      <p:sp>
+        <p:nvSpPr>
+          <p:cNvPr id="4" name="Slide Number Placeholder 3"/>
+          <p:cNvSpPr>
+            <a:spLocks noGrp="1"/>
+          </p:cNvSpPr>
+          <p:nvPr>
+            <p:ph type="sldNum" sz="quarter" idx="10"/>
+          </p:nvPr>
+        </p:nvSpPr>
+        <p:spPr/>
+        <p:txBody>
+          <a:bodyPr/>
+          <a:lstStyle/>
+          <a:p>
+            <a:fld id="{3C85722A-B490-4F7B-A61D-AA19F38B2928}" type="slidenum">
+              <a:rPr lang="sv-SE" smtClean="0"/>
+              <a:t>22</a:t>
+            </a:fld>
+            <a:endParaRPr lang="sv-SE"/>
+          </a:p>
+        </p:txBody>
+      </p:sp>
+    </p:spTree>
+    <p:extLst>
+      <p:ext uri="{BB962C8B-B14F-4D97-AF65-F5344CB8AC3E}">
+        <p14:creationId xmlns:p14="http://schemas.microsoft.com/office/powerpoint/2010/main" val="3164428239"/>
+      </p:ext>
+    </p:extLst>
+  </p:cSld>
+  <p:clrMapOvr>
+    <a:masterClrMapping/>
+  </p:clrMapOvr>
+</p:notes>
+</file>
+
+<file path=ppt/notesSlides/notesSlide14.xml><?xml version="1.0" encoding="utf-8"?>
+<p:notes xmlns:a="http://schemas.openxmlformats.org/drawingml/2006/main" xmlns:r="http://schemas.openxmlformats.org/officeDocument/2006/relationships" xmlns:p="http://schemas.openxmlformats.org/presentationml/2006/main">
+  <p:cSld>
+    <p:spTree>
+      <p:nvGrpSpPr>
+        <p:cNvPr id="1" name=""/>
+        <p:cNvGrpSpPr/>
+        <p:nvPr/>
+      </p:nvGrpSpPr>
+      <p:grpSpPr>
+        <a:xfrm>
+          <a:off x="0" y="0"/>
+          <a:ext cx="0" cy="0"/>
+          <a:chOff x="0" y="0"/>
+          <a:chExt cx="0" cy="0"/>
+        </a:xfrm>
+      </p:grpSpPr>
+      <p:sp>
+        <p:nvSpPr>
+          <p:cNvPr id="2" name="Slide Image Placeholder 1"/>
+          <p:cNvSpPr>
+            <a:spLocks noGrp="1" noRot="1" noChangeAspect="1"/>
+          </p:cNvSpPr>
+          <p:nvPr>
+            <p:ph type="sldImg"/>
+          </p:nvPr>
+        </p:nvSpPr>
+        <p:spPr/>
+      </p:sp>
+      <p:sp>
+        <p:nvSpPr>
+          <p:cNvPr id="3" name="Notes Placeholder 2"/>
+          <p:cNvSpPr>
+            <a:spLocks noGrp="1"/>
+          </p:cNvSpPr>
+          <p:nvPr>
+            <p:ph type="body" idx="1"/>
+          </p:nvPr>
+        </p:nvSpPr>
+        <p:spPr/>
+        <p:txBody>
+          <a:bodyPr/>
+          <a:lstStyle/>
+          <a:p>
+            <a:r>
+              <a:rPr lang="sv-SE" dirty="0"/>
+              <a:t>Anteckna medan man läser</a:t>
+            </a:r>
+          </a:p>
+          <a:p>
+            <a:r>
+              <a:rPr lang="sv-SE" dirty="0"/>
+              <a:t>Visuellt/audiovisuellt lärande</a:t>
+            </a:r>
+          </a:p>
+          <a:p>
+            <a:endParaRPr lang="sv-SE" dirty="0"/>
+          </a:p>
+          <a:p>
+            <a:endParaRPr lang="sv-SE" dirty="0"/>
+          </a:p>
+          <a:p>
+            <a:r>
+              <a:rPr lang="sv-SE" dirty="0"/>
+              <a:t>Många facetter!</a:t>
+            </a:r>
+          </a:p>
+        </p:txBody>
+      </p:sp>
+      <p:sp>
+        <p:nvSpPr>
+          <p:cNvPr id="4" name="Slide Number Placeholder 3"/>
+          <p:cNvSpPr>
+            <a:spLocks noGrp="1"/>
+          </p:cNvSpPr>
+          <p:nvPr>
+            <p:ph type="sldNum" sz="quarter" idx="10"/>
+          </p:nvPr>
+        </p:nvSpPr>
+        <p:spPr/>
+        <p:txBody>
+          <a:bodyPr/>
+          <a:lstStyle/>
+          <a:p>
+            <a:fld id="{3C85722A-B490-4F7B-A61D-AA19F38B2928}" type="slidenum">
+              <a:rPr lang="sv-SE" smtClean="0"/>
+              <a:t>26</a:t>
             </a:fld>
             <a:endParaRPr lang="sv-SE"/>
           </a:p>
@@ -1730,7 +1959,159 @@
           <a:bodyPr/>
           <a:lstStyle/>
           <a:p>
+            <a:r>
+              <a:rPr lang="sv-SE" dirty="0"/>
+              <a:t>Alla vi som är här har förmodligen fått med oss att antingen har man talang för något, eller också inte.</a:t>
+            </a:r>
+          </a:p>
+          <a:p>
+            <a:r>
+              <a:rPr lang="sv-SE" dirty="0"/>
+              <a:t>Både kulturhistoriskt och neurologiskt har man det senaste seklet varit övertygad om att det funnits vissa</a:t>
+            </a:r>
+          </a:p>
+          <a:p>
+            <a:r>
+              <a:rPr lang="sv-SE" dirty="0"/>
+              <a:t>som är genier, som är födde till det, och sen vanliga dödliga. </a:t>
+            </a:r>
+          </a:p>
+          <a:p>
+            <a:r>
+              <a:rPr lang="sv-SE" dirty="0"/>
+              <a:t>Först trodde man att hjärnans neuroner var konstant i antal hela livet, sen när man såg att det inte var så</a:t>
+            </a:r>
+          </a:p>
+          <a:p>
+            <a:r>
+              <a:rPr lang="sv-SE" dirty="0"/>
+              <a:t>fokuserade man på att de växer till väldigt långsamt.</a:t>
+            </a:r>
+          </a:p>
+          <a:p>
             <a:endParaRPr lang="sv-SE" dirty="0"/>
+          </a:p>
+          <a:p>
+            <a:r>
+              <a:rPr lang="sv-SE" dirty="0"/>
+              <a:t>Nyare forskning visar att inlärning och förmågan att ta till sig information inte har något att göra med</a:t>
+            </a:r>
+          </a:p>
+          <a:p>
+            <a:r>
+              <a:rPr lang="sv-SE" dirty="0"/>
+              <a:t>antalet neuroner utan om vilka kopplingar som finns mellan dem. Man kan se det som vilken väg informationen tar –</a:t>
+            </a:r>
+          </a:p>
+          <a:p>
+            <a:r>
+              <a:rPr lang="sv-SE" dirty="0"/>
+              <a:t>Och det är föränderligt. Man säger inte längre att hjärnan är statisk utan plastisk. </a:t>
+            </a:r>
+          </a:p>
+          <a:p>
+            <a:endParaRPr lang="sv-SE" dirty="0"/>
+          </a:p>
+          <a:p>
+            <a:r>
+              <a:rPr lang="sv-SE" dirty="0"/>
+              <a:t>Förenklat kan man säga att när du gör en sak för första gången så uppstår en liten </a:t>
+            </a:r>
+            <a:r>
+              <a:rPr lang="sv-SE" dirty="0" err="1"/>
+              <a:t>vindlig</a:t>
+            </a:r>
+            <a:r>
+              <a:rPr lang="sv-SE" dirty="0"/>
+              <a:t> stig av elektriska signaler genom hjärnan.</a:t>
+            </a:r>
+          </a:p>
+          <a:p>
+            <a:r>
+              <a:rPr lang="sv-SE" dirty="0"/>
+              <a:t>Ju mer du tränar desto mer påverkas hjärnan – stigen blir en landsväg och till slut en motorväg där signalerna kan åka</a:t>
+            </a:r>
+          </a:p>
+          <a:p>
+            <a:r>
+              <a:rPr lang="sv-SE" dirty="0"/>
+              <a:t>snabbt. Då har du bemästrat det du vill lära dig. </a:t>
+            </a:r>
+          </a:p>
+          <a:p>
+            <a:endParaRPr lang="sv-SE" dirty="0"/>
+          </a:p>
+          <a:p>
+            <a:pPr marL="171450" indent="-171450">
+              <a:buFontTx/>
+              <a:buChar char="-"/>
+            </a:pPr>
+            <a:r>
+              <a:rPr lang="sv-SE" dirty="0"/>
+              <a:t>Varför berättar jag det här? En spännande grej som forskning har visat är att bara att veta om det här faktiskt hjälper.</a:t>
+            </a:r>
+          </a:p>
+          <a:p>
+            <a:pPr marL="0" indent="0">
+              <a:buFontTx/>
+              <a:buNone/>
+            </a:pPr>
+            <a:r>
+              <a:rPr lang="sv-SE" dirty="0"/>
+              <a:t>Man skiljer på </a:t>
+            </a:r>
+            <a:r>
+              <a:rPr lang="sv-SE" dirty="0" err="1"/>
+              <a:t>growth</a:t>
+            </a:r>
+            <a:r>
+              <a:rPr lang="sv-SE" dirty="0"/>
+              <a:t> </a:t>
+            </a:r>
+            <a:r>
+              <a:rPr lang="sv-SE" dirty="0" err="1"/>
+              <a:t>mindset</a:t>
+            </a:r>
+            <a:r>
+              <a:rPr lang="sv-SE" dirty="0"/>
+              <a:t> och </a:t>
+            </a:r>
+            <a:r>
+              <a:rPr lang="sv-SE" dirty="0" err="1"/>
+              <a:t>fixed</a:t>
+            </a:r>
+            <a:r>
+              <a:rPr lang="sv-SE" dirty="0"/>
+              <a:t> </a:t>
+            </a:r>
+            <a:r>
+              <a:rPr lang="sv-SE" dirty="0" err="1"/>
+              <a:t>mindset</a:t>
+            </a:r>
+            <a:r>
+              <a:rPr lang="sv-SE" dirty="0"/>
+              <a:t>. Att byta perspektiv från att tro att jag är inget duktig på det här, det </a:t>
+            </a:r>
+          </a:p>
+          <a:p>
+            <a:pPr marL="0" indent="0">
+              <a:buFontTx/>
+              <a:buNone/>
+            </a:pPr>
+            <a:r>
+              <a:rPr lang="sv-SE" dirty="0"/>
+              <a:t>är för att jag inte har talang till att veta och gå med på att hjärnan har möjlighet att ”bygga” talang gjorde att försökspersoner</a:t>
+            </a:r>
+          </a:p>
+          <a:p>
+            <a:pPr marL="0" indent="0">
+              <a:buFontTx/>
+              <a:buNone/>
+            </a:pPr>
+            <a:r>
+              <a:rPr lang="sv-SE" dirty="0"/>
+              <a:t>ökade sin IQ med flera poäng.</a:t>
+            </a:r>
           </a:p>
         </p:txBody>
       </p:sp>
@@ -1760,7 +2141,7 @@
     </p:spTree>
     <p:extLst>
       <p:ext uri="{BB962C8B-B14F-4D97-AF65-F5344CB8AC3E}">
-        <p14:creationId xmlns:p14="http://schemas.microsoft.com/office/powerpoint/2010/main" val="3663503193"/>
+        <p14:creationId xmlns:p14="http://schemas.microsoft.com/office/powerpoint/2010/main" val="414166270"/>
       </p:ext>
     </p:extLst>
   </p:cSld>
@@ -1789,7 +2170,7 @@
       </p:grpSpPr>
       <p:sp>
         <p:nvSpPr>
-          <p:cNvPr id="2" name="Slide Image Placeholder 1"/>
+          <p:cNvPr id="2" name="Platshållare för bildobjekt 1"/>
           <p:cNvSpPr>
             <a:spLocks noGrp="1" noRot="1" noChangeAspect="1"/>
           </p:cNvSpPr>
@@ -1801,7 +2182,7 @@
       </p:sp>
       <p:sp>
         <p:nvSpPr>
-          <p:cNvPr id="3" name="Notes Placeholder 2"/>
+          <p:cNvPr id="3" name="Platshållare för anteckningar 2"/>
           <p:cNvSpPr>
             <a:spLocks noGrp="1"/>
           </p:cNvSpPr>
@@ -1816,66 +2197,14 @@
           <a:p>
             <a:r>
               <a:rPr lang="sv-SE" dirty="0"/>
-              <a:t>Krävs det ett helt tyst rum i en fin miljö?</a:t>
-            </a:r>
-          </a:p>
-          <a:p>
-            <a:endParaRPr lang="sv-SE" dirty="0"/>
-          </a:p>
-          <a:p>
-            <a:r>
-              <a:rPr lang="sv-SE" dirty="0"/>
-              <a:t>Lugn och ro är något man bär med sig.</a:t>
-            </a:r>
-            <a:r>
-              <a:rPr lang="sv-SE" baseline="0" dirty="0"/>
-              <a:t> Kopplat till välmående. Det finns viss forskning som påstår att människor som känner att de mår bra och är balanserade eller glada över något blir smartare, vad nu det betyder.</a:t>
-            </a:r>
-          </a:p>
-          <a:p>
-            <a:r>
-              <a:rPr lang="sv-SE" baseline="0" dirty="0"/>
-              <a:t>Det är inte så konstigt, den som känner sig hoppfull tenderar att försöka lite längre innan den ger upp och ha lättare för att hitta lösningar när saker går åt pipan.</a:t>
-            </a:r>
-            <a:endParaRPr lang="sv-SE" dirty="0"/>
-          </a:p>
-          <a:p>
-            <a:endParaRPr lang="sv-SE" dirty="0"/>
-          </a:p>
-          <a:p>
-            <a:r>
-              <a:rPr lang="sv-SE" dirty="0"/>
-              <a:t>Tankar kommer hoppande och skuttande hela tiden – ta en paus. Vilorum finns. Stäng in dig i mörkret i fem minuter och tänk på ingenting.</a:t>
-            </a:r>
-          </a:p>
-          <a:p>
-            <a:endParaRPr lang="sv-SE" dirty="0"/>
-          </a:p>
-          <a:p>
-            <a:r>
-              <a:rPr lang="sv-SE" dirty="0"/>
-              <a:t>Blir du tokstressad? Kanske dags för meditationsapp. Inte bara för att blir effektivare, bättre, lära sig snabbare...</a:t>
-            </a:r>
-            <a:r>
-              <a:rPr lang="sv-SE" baseline="0" dirty="0"/>
-              <a:t> Vill ju att ni ska må bra </a:t>
-            </a:r>
-            <a:r>
-              <a:rPr lang="sv-SE" baseline="0" dirty="0">
-                <a:sym typeface="Wingdings" panose="05000000000000000000" pitchFamily="2" charset="2"/>
-              </a:rPr>
-              <a:t></a:t>
-            </a:r>
-            <a:endParaRPr lang="sv-SE" dirty="0"/>
-          </a:p>
-          <a:p>
-            <a:endParaRPr lang="sv-SE" dirty="0"/>
-          </a:p>
-        </p:txBody>
-      </p:sp>
-      <p:sp>
-        <p:nvSpPr>
-          <p:cNvPr id="4" name="Slide Number Placeholder 3"/>
+              <a:t>Peak</a:t>
+            </a:r>
+          </a:p>
+        </p:txBody>
+      </p:sp>
+      <p:sp>
+        <p:nvSpPr>
+          <p:cNvPr id="4" name="Platshållare för bildnummer 3"/>
           <p:cNvSpPr>
             <a:spLocks noGrp="1"/>
           </p:cNvSpPr>
@@ -1890,7 +2219,7 @@
           <a:p>
             <a:fld id="{3C85722A-B490-4F7B-A61D-AA19F38B2928}" type="slidenum">
               <a:rPr lang="sv-SE" smtClean="0"/>
-              <a:t>18</a:t>
+              <a:t>11</a:t>
             </a:fld>
             <a:endParaRPr lang="sv-SE"/>
           </a:p>
@@ -1899,7 +2228,7 @@
     </p:spTree>
     <p:extLst>
       <p:ext uri="{BB962C8B-B14F-4D97-AF65-F5344CB8AC3E}">
-        <p14:creationId xmlns:p14="http://schemas.microsoft.com/office/powerpoint/2010/main" val="3006356964"/>
+        <p14:creationId xmlns:p14="http://schemas.microsoft.com/office/powerpoint/2010/main" val="2580878756"/>
       </p:ext>
     </p:extLst>
   </p:cSld>
@@ -5049,7 +5378,13 @@
       </p:grpSpPr>
       <p:sp>
         <p:nvSpPr>
-          <p:cNvPr id="2" name="Rubrik 1"/>
+          <p:cNvPr id="2" name="Rubrik 1">
+            <a:extLst>
+              <a:ext uri="{FF2B5EF4-FFF2-40B4-BE49-F238E27FC236}">
+                <a16:creationId xmlns:a16="http://schemas.microsoft.com/office/drawing/2014/main" id="{6F4F5F59-1C9D-467A-AFA2-A3A28DA58A43}"/>
+              </a:ext>
+            </a:extLst>
+          </p:cNvPr>
           <p:cNvSpPr>
             <a:spLocks noGrp="1"/>
           </p:cNvSpPr>
@@ -5057,143 +5392,71 @@
             <p:ph type="title"/>
           </p:nvPr>
         </p:nvSpPr>
-        <p:spPr>
-          <a:xfrm>
-            <a:off x="896257" y="2368096"/>
-            <a:ext cx="10515600" cy="1325563"/>
-          </a:xfrm>
-        </p:spPr>
+        <p:spPr/>
         <p:txBody>
           <a:bodyPr/>
           <a:lstStyle/>
           <a:p>
             <a:r>
               <a:rPr lang="sv-SE" dirty="0"/>
-              <a:t>Lagom = små bitar</a:t>
-            </a:r>
-          </a:p>
-        </p:txBody>
-      </p:sp>
-      <p:sp>
-        <p:nvSpPr>
-          <p:cNvPr id="4" name="textruta 3"/>
-          <p:cNvSpPr txBox="1"/>
-          <p:nvPr/>
-        </p:nvSpPr>
-        <p:spPr>
-          <a:xfrm>
-            <a:off x="2888342" y="3693192"/>
-            <a:ext cx="3962400" cy="523220"/>
-          </a:xfrm>
-          <a:prstGeom prst="rect">
-            <a:avLst/>
-          </a:prstGeom>
-          <a:noFill/>
-        </p:spPr>
-        <p:txBody>
-          <a:bodyPr wrap="square" rtlCol="0">
-            <a:spAutoFit/>
-          </a:bodyPr>
+              <a:t>Hjärnan: statisk vs plastisk</a:t>
+            </a:r>
+          </a:p>
+        </p:txBody>
+      </p:sp>
+      <p:sp>
+        <p:nvSpPr>
+          <p:cNvPr id="3" name="Platshållare för innehåll 2">
+            <a:extLst>
+              <a:ext uri="{FF2B5EF4-FFF2-40B4-BE49-F238E27FC236}">
+                <a16:creationId xmlns:a16="http://schemas.microsoft.com/office/drawing/2014/main" id="{93425DBB-3292-4E15-BABA-1CD155FCECB3}"/>
+              </a:ext>
+            </a:extLst>
+          </p:cNvPr>
+          <p:cNvSpPr>
+            <a:spLocks noGrp="1"/>
+          </p:cNvSpPr>
+          <p:nvPr>
+            <p:ph idx="1"/>
+          </p:nvPr>
+        </p:nvSpPr>
+        <p:spPr/>
+        <p:txBody>
+          <a:bodyPr/>
           <a:lstStyle/>
           <a:p>
             <a:r>
-              <a:rPr lang="sv-SE" sz="2800" dirty="0"/>
-              <a:t>(Ännu mindre)</a:t>
-            </a:r>
-          </a:p>
-        </p:txBody>
-      </p:sp>
-      <p:sp>
-        <p:nvSpPr>
-          <p:cNvPr id="5" name="textruta 4"/>
-          <p:cNvSpPr txBox="1"/>
-          <p:nvPr/>
-        </p:nvSpPr>
-        <p:spPr>
-          <a:xfrm>
-            <a:off x="3185885" y="4399293"/>
-            <a:ext cx="3962400" cy="369332"/>
-          </a:xfrm>
-          <a:prstGeom prst="rect">
-            <a:avLst/>
-          </a:prstGeom>
-          <a:noFill/>
-        </p:spPr>
-        <p:txBody>
-          <a:bodyPr wrap="square" rtlCol="0">
-            <a:spAutoFit/>
-          </a:bodyPr>
-          <a:lstStyle/>
-          <a:p>
-            <a:r>
               <a:rPr lang="sv-SE" dirty="0"/>
-              <a:t>(Mindre)</a:t>
-            </a:r>
-          </a:p>
-        </p:txBody>
-      </p:sp>
-      <p:sp>
-        <p:nvSpPr>
-          <p:cNvPr id="6" name="textruta 5"/>
-          <p:cNvSpPr txBox="1"/>
-          <p:nvPr/>
-        </p:nvSpPr>
-        <p:spPr>
-          <a:xfrm>
-            <a:off x="3287485" y="4821980"/>
-            <a:ext cx="3962400" cy="369332"/>
-          </a:xfrm>
-          <a:prstGeom prst="rect">
-            <a:avLst/>
-          </a:prstGeom>
-          <a:noFill/>
-        </p:spPr>
-        <p:txBody>
-          <a:bodyPr wrap="square" rtlCol="0">
-            <a:spAutoFit/>
-          </a:bodyPr>
-          <a:lstStyle/>
+              <a:t>Förr: Geniernas tidevarv!</a:t>
+            </a:r>
+          </a:p>
           <a:p>
             <a:r>
               <a:rPr lang="sv-SE" dirty="0"/>
-              <a:t>(Ännu mindre)</a:t>
-            </a:r>
-          </a:p>
-        </p:txBody>
-      </p:sp>
-      <p:sp>
-        <p:nvSpPr>
-          <p:cNvPr id="7" name="textruta 6"/>
-          <p:cNvSpPr txBox="1"/>
-          <p:nvPr/>
-        </p:nvSpPr>
-        <p:spPr>
-          <a:xfrm>
-            <a:off x="3287485" y="5464629"/>
-            <a:ext cx="3962400" cy="369332"/>
-          </a:xfrm>
-          <a:prstGeom prst="rect">
-            <a:avLst/>
-          </a:prstGeom>
-          <a:noFill/>
-        </p:spPr>
-        <p:txBody>
-          <a:bodyPr wrap="square" rtlCol="0">
-            <a:spAutoFit/>
-          </a:bodyPr>
-          <a:lstStyle/>
-          <a:p>
+              <a:t>Nu: Alla kan!</a:t>
+            </a:r>
+          </a:p>
+          <a:p>
+            <a:r>
+              <a:rPr lang="sv-SE" dirty="0" err="1"/>
+              <a:t>Growth</a:t>
+            </a:r>
             <a:r>
               <a:rPr lang="sv-SE" dirty="0"/>
-              <a:t>(Ännu mindre)</a:t>
-            </a:r>
+              <a:t> </a:t>
+            </a:r>
+            <a:r>
+              <a:rPr lang="sv-SE" dirty="0" err="1"/>
+              <a:t>mindset</a:t>
+            </a:r>
+            <a:endParaRPr lang="sv-SE" dirty="0"/>
           </a:p>
         </p:txBody>
       </p:sp>
     </p:spTree>
     <p:extLst>
       <p:ext uri="{BB962C8B-B14F-4D97-AF65-F5344CB8AC3E}">
-        <p14:creationId xmlns:p14="http://schemas.microsoft.com/office/powerpoint/2010/main" val="593872303"/>
+        <p14:creationId xmlns:p14="http://schemas.microsoft.com/office/powerpoint/2010/main" val="3442143036"/>
       </p:ext>
     </p:extLst>
   </p:cSld>
@@ -5222,6 +5485,289 @@
       </p:grpSpPr>
       <p:sp>
         <p:nvSpPr>
+          <p:cNvPr id="2" name="Rubrik 1">
+            <a:extLst>
+              <a:ext uri="{FF2B5EF4-FFF2-40B4-BE49-F238E27FC236}">
+                <a16:creationId xmlns:a16="http://schemas.microsoft.com/office/drawing/2014/main" id="{BBB1C259-9AA0-438C-9F41-FF32499EF5A8}"/>
+              </a:ext>
+            </a:extLst>
+          </p:cNvPr>
+          <p:cNvSpPr>
+            <a:spLocks noGrp="1"/>
+          </p:cNvSpPr>
+          <p:nvPr>
+            <p:ph type="title"/>
+          </p:nvPr>
+        </p:nvSpPr>
+        <p:spPr/>
+        <p:txBody>
+          <a:bodyPr/>
+          <a:lstStyle/>
+          <a:p>
+            <a:r>
+              <a:rPr lang="sv-SE" dirty="0"/>
+              <a:t>Hur bygger man synapsbanor då?</a:t>
+            </a:r>
+          </a:p>
+        </p:txBody>
+      </p:sp>
+      <p:sp>
+        <p:nvSpPr>
+          <p:cNvPr id="3" name="Platshållare för innehåll 2">
+            <a:extLst>
+              <a:ext uri="{FF2B5EF4-FFF2-40B4-BE49-F238E27FC236}">
+                <a16:creationId xmlns:a16="http://schemas.microsoft.com/office/drawing/2014/main" id="{019DFA2F-22BD-407C-91E7-3AD740BDA318}"/>
+              </a:ext>
+            </a:extLst>
+          </p:cNvPr>
+          <p:cNvSpPr>
+            <a:spLocks noGrp="1"/>
+          </p:cNvSpPr>
+          <p:nvPr>
+            <p:ph idx="1"/>
+          </p:nvPr>
+        </p:nvSpPr>
+        <p:spPr/>
+        <p:txBody>
+          <a:bodyPr/>
+          <a:lstStyle/>
+          <a:p>
+            <a:r>
+              <a:rPr lang="sv-SE" dirty="0"/>
+              <a:t>Enkla svaret – träna</a:t>
+            </a:r>
+          </a:p>
+          <a:p>
+            <a:r>
+              <a:rPr lang="sv-SE" dirty="0"/>
+              <a:t>Räcker inte</a:t>
+            </a:r>
+          </a:p>
+          <a:p>
+            <a:r>
+              <a:rPr lang="sv-SE" dirty="0" err="1"/>
+              <a:t>Deliberate</a:t>
+            </a:r>
+            <a:r>
+              <a:rPr lang="sv-SE" dirty="0"/>
+              <a:t> </a:t>
+            </a:r>
+            <a:r>
+              <a:rPr lang="sv-SE" dirty="0" err="1"/>
+              <a:t>practise</a:t>
+            </a:r>
+            <a:endParaRPr lang="sv-SE"/>
+          </a:p>
+          <a:p>
+            <a:endParaRPr lang="sv-SE" dirty="0"/>
+          </a:p>
+        </p:txBody>
+      </p:sp>
+    </p:spTree>
+    <p:extLst>
+      <p:ext uri="{BB962C8B-B14F-4D97-AF65-F5344CB8AC3E}">
+        <p14:creationId xmlns:p14="http://schemas.microsoft.com/office/powerpoint/2010/main" val="129463198"/>
+      </p:ext>
+    </p:extLst>
+  </p:cSld>
+  <p:clrMapOvr>
+    <a:masterClrMapping/>
+  </p:clrMapOvr>
+</p:sld>
+</file>
+
+<file path=ppt/slides/slide12.xml><?xml version="1.0" encoding="utf-8"?>
+<p:sld xmlns:a="http://schemas.openxmlformats.org/drawingml/2006/main" xmlns:r="http://schemas.openxmlformats.org/officeDocument/2006/relationships" xmlns:p="http://schemas.openxmlformats.org/presentationml/2006/main">
+  <p:cSld>
+    <p:spTree>
+      <p:nvGrpSpPr>
+        <p:cNvPr id="1" name=""/>
+        <p:cNvGrpSpPr/>
+        <p:nvPr/>
+      </p:nvGrpSpPr>
+      <p:grpSpPr>
+        <a:xfrm>
+          <a:off x="0" y="0"/>
+          <a:ext cx="0" cy="0"/>
+          <a:chOff x="0" y="0"/>
+          <a:chExt cx="0" cy="0"/>
+        </a:xfrm>
+      </p:grpSpPr>
+      <p:sp>
+        <p:nvSpPr>
+          <p:cNvPr id="2" name="Rubrik 1"/>
+          <p:cNvSpPr>
+            <a:spLocks noGrp="1"/>
+          </p:cNvSpPr>
+          <p:nvPr>
+            <p:ph type="title"/>
+          </p:nvPr>
+        </p:nvSpPr>
+        <p:spPr>
+          <a:xfrm>
+            <a:off x="896257" y="2368096"/>
+            <a:ext cx="10515600" cy="1325563"/>
+          </a:xfrm>
+        </p:spPr>
+        <p:txBody>
+          <a:bodyPr/>
+          <a:lstStyle/>
+          <a:p>
+            <a:r>
+              <a:rPr lang="sv-SE" dirty="0"/>
+              <a:t>Lagom = små bitar</a:t>
+            </a:r>
+          </a:p>
+        </p:txBody>
+      </p:sp>
+      <p:sp>
+        <p:nvSpPr>
+          <p:cNvPr id="4" name="textruta 3"/>
+          <p:cNvSpPr txBox="1"/>
+          <p:nvPr/>
+        </p:nvSpPr>
+        <p:spPr>
+          <a:xfrm>
+            <a:off x="2888342" y="3693192"/>
+            <a:ext cx="3962400" cy="523220"/>
+          </a:xfrm>
+          <a:prstGeom prst="rect">
+            <a:avLst/>
+          </a:prstGeom>
+          <a:noFill/>
+        </p:spPr>
+        <p:txBody>
+          <a:bodyPr wrap="square" rtlCol="0">
+            <a:spAutoFit/>
+          </a:bodyPr>
+          <a:lstStyle/>
+          <a:p>
+            <a:r>
+              <a:rPr lang="sv-SE" sz="2800" dirty="0"/>
+              <a:t>(Ännu mindre)</a:t>
+            </a:r>
+          </a:p>
+        </p:txBody>
+      </p:sp>
+      <p:sp>
+        <p:nvSpPr>
+          <p:cNvPr id="5" name="textruta 4"/>
+          <p:cNvSpPr txBox="1"/>
+          <p:nvPr/>
+        </p:nvSpPr>
+        <p:spPr>
+          <a:xfrm>
+            <a:off x="3185885" y="4399293"/>
+            <a:ext cx="3962400" cy="369332"/>
+          </a:xfrm>
+          <a:prstGeom prst="rect">
+            <a:avLst/>
+          </a:prstGeom>
+          <a:noFill/>
+        </p:spPr>
+        <p:txBody>
+          <a:bodyPr wrap="square" rtlCol="0">
+            <a:spAutoFit/>
+          </a:bodyPr>
+          <a:lstStyle/>
+          <a:p>
+            <a:r>
+              <a:rPr lang="sv-SE" dirty="0"/>
+              <a:t>(Mindre)</a:t>
+            </a:r>
+          </a:p>
+        </p:txBody>
+      </p:sp>
+      <p:sp>
+        <p:nvSpPr>
+          <p:cNvPr id="6" name="textruta 5"/>
+          <p:cNvSpPr txBox="1"/>
+          <p:nvPr/>
+        </p:nvSpPr>
+        <p:spPr>
+          <a:xfrm>
+            <a:off x="3287485" y="4821980"/>
+            <a:ext cx="3962400" cy="369332"/>
+          </a:xfrm>
+          <a:prstGeom prst="rect">
+            <a:avLst/>
+          </a:prstGeom>
+          <a:noFill/>
+        </p:spPr>
+        <p:txBody>
+          <a:bodyPr wrap="square" rtlCol="0">
+            <a:spAutoFit/>
+          </a:bodyPr>
+          <a:lstStyle/>
+          <a:p>
+            <a:r>
+              <a:rPr lang="sv-SE" dirty="0"/>
+              <a:t>(Ännu mindre)</a:t>
+            </a:r>
+          </a:p>
+        </p:txBody>
+      </p:sp>
+      <p:sp>
+        <p:nvSpPr>
+          <p:cNvPr id="7" name="textruta 6"/>
+          <p:cNvSpPr txBox="1"/>
+          <p:nvPr/>
+        </p:nvSpPr>
+        <p:spPr>
+          <a:xfrm>
+            <a:off x="3287485" y="5464629"/>
+            <a:ext cx="3962400" cy="369332"/>
+          </a:xfrm>
+          <a:prstGeom prst="rect">
+            <a:avLst/>
+          </a:prstGeom>
+          <a:noFill/>
+        </p:spPr>
+        <p:txBody>
+          <a:bodyPr wrap="square" rtlCol="0">
+            <a:spAutoFit/>
+          </a:bodyPr>
+          <a:lstStyle/>
+          <a:p>
+            <a:r>
+              <a:rPr lang="sv-SE" dirty="0"/>
+              <a:t>(Ännu mindre)</a:t>
+            </a:r>
+          </a:p>
+        </p:txBody>
+      </p:sp>
+    </p:spTree>
+    <p:extLst>
+      <p:ext uri="{BB962C8B-B14F-4D97-AF65-F5344CB8AC3E}">
+        <p14:creationId xmlns:p14="http://schemas.microsoft.com/office/powerpoint/2010/main" val="593872303"/>
+      </p:ext>
+    </p:extLst>
+  </p:cSld>
+  <p:clrMapOvr>
+    <a:masterClrMapping/>
+  </p:clrMapOvr>
+</p:sld>
+</file>
+
+<file path=ppt/slides/slide13.xml><?xml version="1.0" encoding="utf-8"?>
+<p:sld xmlns:a="http://schemas.openxmlformats.org/drawingml/2006/main" xmlns:r="http://schemas.openxmlformats.org/officeDocument/2006/relationships" xmlns:p="http://schemas.openxmlformats.org/presentationml/2006/main">
+  <p:cSld>
+    <p:spTree>
+      <p:nvGrpSpPr>
+        <p:cNvPr id="1" name=""/>
+        <p:cNvGrpSpPr/>
+        <p:nvPr/>
+      </p:nvGrpSpPr>
+      <p:grpSpPr>
+        <a:xfrm>
+          <a:off x="0" y="0"/>
+          <a:ext cx="0" cy="0"/>
+          <a:chOff x="0" y="0"/>
+          <a:chExt cx="0" cy="0"/>
+        </a:xfrm>
+      </p:grpSpPr>
+      <p:sp>
+        <p:nvSpPr>
           <p:cNvPr id="2" name="Title 1"/>
           <p:cNvSpPr>
             <a:spLocks noGrp="1"/>
@@ -5508,7 +6054,7 @@
 </p:sld>
 </file>
 
-<file path=ppt/slides/slide12.xml><?xml version="1.0" encoding="utf-8"?>
+<file path=ppt/slides/slide14.xml><?xml version="1.0" encoding="utf-8"?>
 <p:sld xmlns:a="http://schemas.openxmlformats.org/drawingml/2006/main" xmlns:r="http://schemas.openxmlformats.org/officeDocument/2006/relationships" xmlns:p="http://schemas.openxmlformats.org/presentationml/2006/main">
   <p:cSld>
     <p:spTree>
@@ -7212,7 +7758,7 @@
 </p:sld>
 </file>
 
-<file path=ppt/slides/slide13.xml><?xml version="1.0" encoding="utf-8"?>
+<file path=ppt/slides/slide15.xml><?xml version="1.0" encoding="utf-8"?>
 <p:sld xmlns:a="http://schemas.openxmlformats.org/drawingml/2006/main" xmlns:r="http://schemas.openxmlformats.org/officeDocument/2006/relationships" xmlns:p="http://schemas.openxmlformats.org/presentationml/2006/main">
   <p:cSld>
     <p:spTree>
@@ -9570,142 +10116,6 @@
 </p:sld>
 </file>
 
-<file path=ppt/slides/slide14.xml><?xml version="1.0" encoding="utf-8"?>
-<p:sld xmlns:a="http://schemas.openxmlformats.org/drawingml/2006/main" xmlns:r="http://schemas.openxmlformats.org/officeDocument/2006/relationships" xmlns:p="http://schemas.openxmlformats.org/presentationml/2006/main">
-  <p:cSld>
-    <p:spTree>
-      <p:nvGrpSpPr>
-        <p:cNvPr id="1" name=""/>
-        <p:cNvGrpSpPr/>
-        <p:nvPr/>
-      </p:nvGrpSpPr>
-      <p:grpSpPr>
-        <a:xfrm>
-          <a:off x="0" y="0"/>
-          <a:ext cx="0" cy="0"/>
-          <a:chOff x="0" y="0"/>
-          <a:chExt cx="0" cy="0"/>
-        </a:xfrm>
-      </p:grpSpPr>
-      <p:sp>
-        <p:nvSpPr>
-          <p:cNvPr id="2" name="Rubrik 1"/>
-          <p:cNvSpPr>
-            <a:spLocks noGrp="1"/>
-          </p:cNvSpPr>
-          <p:nvPr>
-            <p:ph type="title"/>
-          </p:nvPr>
-        </p:nvSpPr>
-        <p:spPr/>
-        <p:txBody>
-          <a:bodyPr/>
-          <a:lstStyle/>
-          <a:p>
-            <a:endParaRPr lang="sv-SE"/>
-          </a:p>
-        </p:txBody>
-      </p:sp>
-      <p:sp>
-        <p:nvSpPr>
-          <p:cNvPr id="3" name="Platshållare för innehåll 2"/>
-          <p:cNvSpPr>
-            <a:spLocks noGrp="1"/>
-          </p:cNvSpPr>
-          <p:nvPr>
-            <p:ph idx="1"/>
-          </p:nvPr>
-        </p:nvSpPr>
-        <p:spPr/>
-        <p:txBody>
-          <a:bodyPr/>
-          <a:lstStyle/>
-          <a:p>
-            <a:endParaRPr lang="sv-SE"/>
-          </a:p>
-        </p:txBody>
-      </p:sp>
-    </p:spTree>
-    <p:extLst>
-      <p:ext uri="{BB962C8B-B14F-4D97-AF65-F5344CB8AC3E}">
-        <p14:creationId xmlns:p14="http://schemas.microsoft.com/office/powerpoint/2010/main" val="686752932"/>
-      </p:ext>
-    </p:extLst>
-  </p:cSld>
-  <p:clrMapOvr>
-    <a:masterClrMapping/>
-  </p:clrMapOvr>
-</p:sld>
-</file>
-
-<file path=ppt/slides/slide15.xml><?xml version="1.0" encoding="utf-8"?>
-<p:sld xmlns:a="http://schemas.openxmlformats.org/drawingml/2006/main" xmlns:r="http://schemas.openxmlformats.org/officeDocument/2006/relationships" xmlns:p="http://schemas.openxmlformats.org/presentationml/2006/main">
-  <p:cSld>
-    <p:spTree>
-      <p:nvGrpSpPr>
-        <p:cNvPr id="1" name=""/>
-        <p:cNvGrpSpPr/>
-        <p:nvPr/>
-      </p:nvGrpSpPr>
-      <p:grpSpPr>
-        <a:xfrm>
-          <a:off x="0" y="0"/>
-          <a:ext cx="0" cy="0"/>
-          <a:chOff x="0" y="0"/>
-          <a:chExt cx="0" cy="0"/>
-        </a:xfrm>
-      </p:grpSpPr>
-      <p:sp>
-        <p:nvSpPr>
-          <p:cNvPr id="2" name="Rubrik 1"/>
-          <p:cNvSpPr>
-            <a:spLocks noGrp="1"/>
-          </p:cNvSpPr>
-          <p:nvPr>
-            <p:ph type="title"/>
-          </p:nvPr>
-        </p:nvSpPr>
-        <p:spPr/>
-        <p:txBody>
-          <a:bodyPr/>
-          <a:lstStyle/>
-          <a:p>
-            <a:endParaRPr lang="sv-SE"/>
-          </a:p>
-        </p:txBody>
-      </p:sp>
-      <p:sp>
-        <p:nvSpPr>
-          <p:cNvPr id="3" name="Platshållare för innehåll 2"/>
-          <p:cNvSpPr>
-            <a:spLocks noGrp="1"/>
-          </p:cNvSpPr>
-          <p:nvPr>
-            <p:ph idx="1"/>
-          </p:nvPr>
-        </p:nvSpPr>
-        <p:spPr/>
-        <p:txBody>
-          <a:bodyPr/>
-          <a:lstStyle/>
-          <a:p>
-            <a:endParaRPr lang="sv-SE"/>
-          </a:p>
-        </p:txBody>
-      </p:sp>
-    </p:spTree>
-    <p:extLst>
-      <p:ext uri="{BB962C8B-B14F-4D97-AF65-F5344CB8AC3E}">
-        <p14:creationId xmlns:p14="http://schemas.microsoft.com/office/powerpoint/2010/main" val="3634861419"/>
-      </p:ext>
-    </p:extLst>
-  </p:cSld>
-  <p:clrMapOvr>
-    <a:masterClrMapping/>
-  </p:clrMapOvr>
-</p:sld>
-</file>
-
 <file path=ppt/slides/slide16.xml><?xml version="1.0" encoding="utf-8"?>
 <p:sld xmlns:a="http://schemas.openxmlformats.org/drawingml/2006/main" xmlns:r="http://schemas.openxmlformats.org/officeDocument/2006/relationships" xmlns:p="http://schemas.openxmlformats.org/presentationml/2006/main">
   <p:cSld>
@@ -9725,7 +10135,7 @@
       </p:grpSpPr>
       <p:sp>
         <p:nvSpPr>
-          <p:cNvPr id="2" name="Title 1"/>
+          <p:cNvPr id="2" name="Rubrik 1"/>
           <p:cNvSpPr>
             <a:spLocks noGrp="1"/>
           </p:cNvSpPr>
@@ -9738,16 +10148,13 @@
           <a:bodyPr/>
           <a:lstStyle/>
           <a:p>
-            <a:r>
-              <a:rPr lang="sv-SE" dirty="0"/>
-              <a:t>A-B-C = 3 sessioner à 45-90 minuter</a:t>
-            </a:r>
-          </a:p>
-        </p:txBody>
-      </p:sp>
-      <p:sp>
-        <p:nvSpPr>
-          <p:cNvPr id="3" name="Content Placeholder 2"/>
+            <a:endParaRPr lang="sv-SE"/>
+          </a:p>
+        </p:txBody>
+      </p:sp>
+      <p:sp>
+        <p:nvSpPr>
+          <p:cNvPr id="3" name="Platshållare för innehåll 2"/>
           <p:cNvSpPr>
             <a:spLocks noGrp="1"/>
           </p:cNvSpPr>
@@ -9760,14 +10167,14 @@
           <a:bodyPr/>
           <a:lstStyle/>
           <a:p>
-            <a:endParaRPr lang="sv-SE" dirty="0"/>
+            <a:endParaRPr lang="sv-SE"/>
           </a:p>
         </p:txBody>
       </p:sp>
     </p:spTree>
     <p:extLst>
       <p:ext uri="{BB962C8B-B14F-4D97-AF65-F5344CB8AC3E}">
-        <p14:creationId xmlns:p14="http://schemas.microsoft.com/office/powerpoint/2010/main" val="1201748117"/>
+        <p14:creationId xmlns:p14="http://schemas.microsoft.com/office/powerpoint/2010/main" val="686752932"/>
       </p:ext>
     </p:extLst>
   </p:cSld>
@@ -9796,7 +10203,7 @@
       </p:grpSpPr>
       <p:sp>
         <p:nvSpPr>
-          <p:cNvPr id="2" name="Title 1"/>
+          <p:cNvPr id="2" name="Rubrik 1"/>
           <p:cNvSpPr>
             <a:spLocks noGrp="1"/>
           </p:cNvSpPr>
@@ -9804,27 +10211,38 @@
             <p:ph type="title"/>
           </p:nvPr>
         </p:nvSpPr>
-        <p:spPr>
-          <a:xfrm>
-            <a:off x="838199" y="365125"/>
-            <a:ext cx="10921409" cy="5429619"/>
-          </a:xfrm>
-        </p:spPr>
+        <p:spPr/>
         <p:txBody>
           <a:bodyPr/>
           <a:lstStyle/>
           <a:p>
-            <a:r>
-              <a:rPr lang="sv-SE" dirty="0"/>
-              <a:t>Lugn och ro</a:t>
-            </a:r>
+            <a:endParaRPr lang="sv-SE"/>
+          </a:p>
+        </p:txBody>
+      </p:sp>
+      <p:sp>
+        <p:nvSpPr>
+          <p:cNvPr id="3" name="Platshållare för innehåll 2"/>
+          <p:cNvSpPr>
+            <a:spLocks noGrp="1"/>
+          </p:cNvSpPr>
+          <p:nvPr>
+            <p:ph idx="1"/>
+          </p:nvPr>
+        </p:nvSpPr>
+        <p:spPr/>
+        <p:txBody>
+          <a:bodyPr/>
+          <a:lstStyle/>
+          <a:p>
+            <a:endParaRPr lang="sv-SE"/>
           </a:p>
         </p:txBody>
       </p:sp>
     </p:spTree>
     <p:extLst>
       <p:ext uri="{BB962C8B-B14F-4D97-AF65-F5344CB8AC3E}">
-        <p14:creationId xmlns:p14="http://schemas.microsoft.com/office/powerpoint/2010/main" val="3222124925"/>
+        <p14:creationId xmlns:p14="http://schemas.microsoft.com/office/powerpoint/2010/main" val="3634861419"/>
       </p:ext>
     </p:extLst>
   </p:cSld>
@@ -9868,7 +10286,7 @@
           <a:p>
             <a:r>
               <a:rPr lang="sv-SE" dirty="0"/>
-              <a:t>Vad är lugn och ro?</a:t>
+              <a:t>A-B-C = 3 sessioner à 45-90 minuter</a:t>
             </a:r>
           </a:p>
         </p:txBody>
@@ -9895,7 +10313,7 @@
     </p:spTree>
     <p:extLst>
       <p:ext uri="{BB962C8B-B14F-4D97-AF65-F5344CB8AC3E}">
-        <p14:creationId xmlns:p14="http://schemas.microsoft.com/office/powerpoint/2010/main" val="1655812774"/>
+        <p14:creationId xmlns:p14="http://schemas.microsoft.com/office/powerpoint/2010/main" val="1201748117"/>
       </p:ext>
     </p:extLst>
   </p:cSld>
@@ -9932,48 +10350,19 @@
             <p:ph type="title"/>
           </p:nvPr>
         </p:nvSpPr>
-        <p:spPr/>
+        <p:spPr>
+          <a:xfrm>
+            <a:off x="838199" y="365125"/>
+            <a:ext cx="10921409" cy="5429619"/>
+          </a:xfrm>
+        </p:spPr>
         <p:txBody>
           <a:bodyPr/>
           <a:lstStyle/>
           <a:p>
             <a:r>
               <a:rPr lang="sv-SE" dirty="0"/>
-              <a:t>Studera effektivt? Studera stressfritt!!! (Lätt att säga...)</a:t>
-            </a:r>
-          </a:p>
-        </p:txBody>
-      </p:sp>
-      <p:sp>
-        <p:nvSpPr>
-          <p:cNvPr id="3" name="Content Placeholder 2"/>
-          <p:cNvSpPr>
-            <a:spLocks noGrp="1"/>
-          </p:cNvSpPr>
-          <p:nvPr>
-            <p:ph idx="1"/>
-          </p:nvPr>
-        </p:nvSpPr>
-        <p:spPr/>
-        <p:txBody>
-          <a:bodyPr/>
-          <a:lstStyle/>
-          <a:p>
-            <a:r>
-              <a:rPr lang="sv-SE" dirty="0"/>
-              <a:t>Stress är en formidabel mental blockerare</a:t>
-            </a:r>
-          </a:p>
-          <a:p>
-            <a:r>
-              <a:rPr lang="sv-SE" dirty="0"/>
-              <a:t>Ändra sina vanor – KBT, hälsokurer....</a:t>
-            </a:r>
-          </a:p>
-          <a:p>
-            <a:r>
-              <a:rPr lang="sv-SE" dirty="0"/>
-              <a:t>Lära sig om hur lärande funkar</a:t>
+              <a:t>Lugn och ro</a:t>
             </a:r>
           </a:p>
         </p:txBody>
@@ -9981,7 +10370,7 @@
     </p:spTree>
     <p:extLst>
       <p:ext uri="{BB962C8B-B14F-4D97-AF65-F5344CB8AC3E}">
-        <p14:creationId xmlns:p14="http://schemas.microsoft.com/office/powerpoint/2010/main" val="3690439906"/>
+        <p14:creationId xmlns:p14="http://schemas.microsoft.com/office/powerpoint/2010/main" val="3222124925"/>
       </p:ext>
     </p:extLst>
   </p:cSld>
@@ -12595,7 +12984,7 @@
           <a:p>
             <a:r>
               <a:rPr lang="sv-SE" dirty="0"/>
-              <a:t>Byt perspektiv</a:t>
+              <a:t>Vad är lugn och ro?</a:t>
             </a:r>
           </a:p>
         </p:txBody>
@@ -12615,29 +13004,14 @@
           <a:bodyPr/>
           <a:lstStyle/>
           <a:p>
-            <a:r>
-              <a:rPr lang="sv-SE" dirty="0"/>
-              <a:t>Se lärande som något som går långsamt, men som har nivåer</a:t>
-            </a:r>
-          </a:p>
-          <a:p>
-            <a:r>
-              <a:rPr lang="sv-SE" dirty="0"/>
-              <a:t>Sov på saken</a:t>
-            </a:r>
-          </a:p>
-          <a:p>
-            <a:r>
-              <a:rPr lang="sv-SE" dirty="0"/>
-              <a:t>Multitaska inte!</a:t>
-            </a:r>
+            <a:endParaRPr lang="sv-SE" dirty="0"/>
           </a:p>
         </p:txBody>
       </p:sp>
     </p:spTree>
     <p:extLst>
       <p:ext uri="{BB962C8B-B14F-4D97-AF65-F5344CB8AC3E}">
-        <p14:creationId xmlns:p14="http://schemas.microsoft.com/office/powerpoint/2010/main" val="1050161643"/>
+        <p14:creationId xmlns:p14="http://schemas.microsoft.com/office/powerpoint/2010/main" val="1655812774"/>
       </p:ext>
     </p:extLst>
   </p:cSld>
@@ -12681,7 +13055,7 @@
           <a:p>
             <a:r>
               <a:rPr lang="sv-SE" dirty="0"/>
-              <a:t>Vilket lärande orkar jag med idag?</a:t>
+              <a:t>Studera effektivt? Studera stressfritt!!! (Lätt att säga...)</a:t>
             </a:r>
           </a:p>
         </p:txBody>
@@ -12703,31 +13077,19 @@
           <a:p>
             <a:r>
               <a:rPr lang="sv-SE" dirty="0"/>
-              <a:t>Skummläsa en längre text/slötitta på en föreläsning?</a:t>
+              <a:t>Stress är en formidabel mental blockerare</a:t>
             </a:r>
           </a:p>
           <a:p>
             <a:r>
               <a:rPr lang="sv-SE" dirty="0"/>
-              <a:t>Ta tio minuters djup koncentration för att förstå ett klurigt koncept?</a:t>
+              <a:t>Ändra sina vanor – KBT, hälsokurer....</a:t>
             </a:r>
           </a:p>
           <a:p>
             <a:r>
               <a:rPr lang="sv-SE" dirty="0"/>
-              <a:t>Ta 45 minuters uppmärksam läsning/titta/lyssna uppmärksamt (tips: anteckna) på en föreläsning?</a:t>
-            </a:r>
-          </a:p>
-          <a:p>
-            <a:r>
-              <a:rPr lang="sv-SE" dirty="0"/>
-              <a:t>Repetera något jag nästan kan (nästan ingen koncentration alls)</a:t>
-            </a:r>
-          </a:p>
-          <a:p>
-            <a:r>
-              <a:rPr lang="sv-SE" u="sng" dirty="0"/>
-              <a:t>Eller kanske jag behöver vila? </a:t>
+              <a:t>Lära sig om hur lärande funkar</a:t>
             </a:r>
           </a:p>
         </p:txBody>
@@ -12735,7 +13097,7 @@
     </p:spTree>
     <p:extLst>
       <p:ext uri="{BB962C8B-B14F-4D97-AF65-F5344CB8AC3E}">
-        <p14:creationId xmlns:p14="http://schemas.microsoft.com/office/powerpoint/2010/main" val="2619356599"/>
+        <p14:creationId xmlns:p14="http://schemas.microsoft.com/office/powerpoint/2010/main" val="3690439906"/>
       </p:ext>
     </p:extLst>
   </p:cSld>
@@ -12777,7 +13139,10 @@
           <a:bodyPr/>
           <a:lstStyle/>
           <a:p>
-            <a:endParaRPr lang="sv-SE"/>
+            <a:r>
+              <a:rPr lang="sv-SE" dirty="0"/>
+              <a:t>Byt perspektiv</a:t>
+            </a:r>
           </a:p>
         </p:txBody>
       </p:sp>
@@ -12796,14 +13161,29 @@
           <a:bodyPr/>
           <a:lstStyle/>
           <a:p>
-            <a:endParaRPr lang="sv-SE"/>
+            <a:r>
+              <a:rPr lang="sv-SE" dirty="0"/>
+              <a:t>Se lärande som något som går långsamt, men som har nivåer</a:t>
+            </a:r>
+          </a:p>
+          <a:p>
+            <a:r>
+              <a:rPr lang="sv-SE" dirty="0"/>
+              <a:t>Sov på saken</a:t>
+            </a:r>
+          </a:p>
+          <a:p>
+            <a:r>
+              <a:rPr lang="sv-SE" dirty="0"/>
+              <a:t>Multitaska inte!</a:t>
+            </a:r>
           </a:p>
         </p:txBody>
       </p:sp>
     </p:spTree>
     <p:extLst>
       <p:ext uri="{BB962C8B-B14F-4D97-AF65-F5344CB8AC3E}">
-        <p14:creationId xmlns:p14="http://schemas.microsoft.com/office/powerpoint/2010/main" val="3095243188"/>
+        <p14:creationId xmlns:p14="http://schemas.microsoft.com/office/powerpoint/2010/main" val="1050161643"/>
       </p:ext>
     </p:extLst>
   </p:cSld>
@@ -12832,129 +13212,68 @@
       </p:grpSpPr>
       <p:sp>
         <p:nvSpPr>
-          <p:cNvPr id="4" name="Oval 3"/>
-          <p:cNvSpPr/>
-          <p:nvPr/>
-        </p:nvSpPr>
-        <p:spPr>
-          <a:xfrm>
-            <a:off x="3644721" y="2614411"/>
-            <a:ext cx="3618964" cy="1352282"/>
-          </a:xfrm>
-          <a:prstGeom prst="ellipse">
-            <a:avLst/>
-          </a:prstGeom>
-        </p:spPr>
-        <p:style>
-          <a:lnRef idx="2">
-            <a:schemeClr val="accent1">
-              <a:shade val="50000"/>
-            </a:schemeClr>
-          </a:lnRef>
-          <a:fillRef idx="1">
-            <a:schemeClr val="accent1"/>
-          </a:fillRef>
-          <a:effectRef idx="0">
-            <a:schemeClr val="accent1"/>
-          </a:effectRef>
-          <a:fontRef idx="minor">
-            <a:schemeClr val="lt1"/>
-          </a:fontRef>
-        </p:style>
-        <p:txBody>
-          <a:bodyPr rtlCol="0" anchor="ctr"/>
+          <p:cNvPr id="2" name="Title 1"/>
+          <p:cNvSpPr>
+            <a:spLocks noGrp="1"/>
+          </p:cNvSpPr>
+          <p:nvPr>
+            <p:ph type="title"/>
+          </p:nvPr>
+        </p:nvSpPr>
+        <p:spPr/>
+        <p:txBody>
+          <a:bodyPr/>
           <a:lstStyle/>
           <a:p>
-            <a:pPr algn="ctr"/>
             <a:r>
               <a:rPr lang="sv-SE" dirty="0"/>
-              <a:t>Lärande</a:t>
-            </a:r>
-          </a:p>
-        </p:txBody>
-      </p:sp>
-      <p:sp>
-        <p:nvSpPr>
-          <p:cNvPr id="5" name="Oval 4"/>
-          <p:cNvSpPr/>
-          <p:nvPr/>
-        </p:nvSpPr>
-        <p:spPr>
-          <a:xfrm>
-            <a:off x="7959144" y="1944710"/>
-            <a:ext cx="1519707" cy="759853"/>
-          </a:xfrm>
-          <a:prstGeom prst="ellipse">
-            <a:avLst/>
-          </a:prstGeom>
-        </p:spPr>
-        <p:style>
-          <a:lnRef idx="2">
-            <a:schemeClr val="accent1">
-              <a:shade val="50000"/>
-            </a:schemeClr>
-          </a:lnRef>
-          <a:fillRef idx="1">
-            <a:schemeClr val="accent1"/>
-          </a:fillRef>
-          <a:effectRef idx="0">
-            <a:schemeClr val="accent1"/>
-          </a:effectRef>
-          <a:fontRef idx="minor">
-            <a:schemeClr val="lt1"/>
-          </a:fontRef>
-        </p:style>
-        <p:txBody>
-          <a:bodyPr rtlCol="0" anchor="ctr"/>
+              <a:t>Vilket lärande orkar jag med idag?</a:t>
+            </a:r>
+          </a:p>
+        </p:txBody>
+      </p:sp>
+      <p:sp>
+        <p:nvSpPr>
+          <p:cNvPr id="3" name="Content Placeholder 2"/>
+          <p:cNvSpPr>
+            <a:spLocks noGrp="1"/>
+          </p:cNvSpPr>
+          <p:nvPr>
+            <p:ph idx="1"/>
+          </p:nvPr>
+        </p:nvSpPr>
+        <p:spPr/>
+        <p:txBody>
+          <a:bodyPr/>
           <a:lstStyle/>
           <a:p>
-            <a:pPr algn="ctr"/>
             <a:r>
               <a:rPr lang="sv-SE" dirty="0"/>
-              <a:t>Kognitiv förmåga</a:t>
-            </a:r>
-          </a:p>
-        </p:txBody>
-      </p:sp>
-      <p:sp>
-        <p:nvSpPr>
-          <p:cNvPr id="6" name="Oval 5"/>
-          <p:cNvSpPr/>
-          <p:nvPr/>
-        </p:nvSpPr>
-        <p:spPr>
-          <a:xfrm>
-            <a:off x="1970468" y="1738648"/>
-            <a:ext cx="1481070" cy="875763"/>
-          </a:xfrm>
-          <a:prstGeom prst="ellipse">
-            <a:avLst/>
-          </a:prstGeom>
-        </p:spPr>
-        <p:style>
-          <a:lnRef idx="2">
-            <a:schemeClr val="accent1">
-              <a:shade val="50000"/>
-            </a:schemeClr>
-          </a:lnRef>
-          <a:fillRef idx="1">
-            <a:schemeClr val="accent1"/>
-          </a:fillRef>
-          <a:effectRef idx="0">
-            <a:schemeClr val="accent1"/>
-          </a:effectRef>
-          <a:fontRef idx="minor">
-            <a:schemeClr val="lt1"/>
-          </a:fontRef>
-        </p:style>
-        <p:txBody>
-          <a:bodyPr rtlCol="0" anchor="ctr"/>
-          <a:lstStyle/>
-          <a:p>
-            <a:pPr algn="ctr"/>
+              <a:t>Skummläsa en längre text/slötitta på en föreläsning?</a:t>
+            </a:r>
+          </a:p>
+          <a:p>
             <a:r>
               <a:rPr lang="sv-SE" dirty="0"/>
-              <a:t>tekniker</a:t>
+              <a:t>Ta tio minuters djup koncentration för att förstå ett klurigt koncept?</a:t>
+            </a:r>
+          </a:p>
+          <a:p>
+            <a:r>
+              <a:rPr lang="sv-SE" dirty="0"/>
+              <a:t>Ta 45 minuters uppmärksam läsning/titta/lyssna uppmärksamt (tips: anteckna) på en föreläsning?</a:t>
+            </a:r>
+          </a:p>
+          <a:p>
+            <a:r>
+              <a:rPr lang="sv-SE" dirty="0"/>
+              <a:t>Repetera något jag nästan kan (nästan ingen koncentration alls)</a:t>
+            </a:r>
+          </a:p>
+          <a:p>
+            <a:r>
+              <a:rPr lang="sv-SE" u="sng" dirty="0"/>
+              <a:t>Eller kanske jag behöver vila? </a:t>
             </a:r>
           </a:p>
         </p:txBody>
@@ -12962,7 +13281,7 @@
     </p:spTree>
     <p:extLst>
       <p:ext uri="{BB962C8B-B14F-4D97-AF65-F5344CB8AC3E}">
-        <p14:creationId xmlns:p14="http://schemas.microsoft.com/office/powerpoint/2010/main" val="1457663304"/>
+        <p14:creationId xmlns:p14="http://schemas.microsoft.com/office/powerpoint/2010/main" val="2619356599"/>
       </p:ext>
     </p:extLst>
   </p:cSld>
@@ -13004,6 +13323,233 @@
           <a:bodyPr/>
           <a:lstStyle/>
           <a:p>
+            <a:endParaRPr lang="sv-SE"/>
+          </a:p>
+        </p:txBody>
+      </p:sp>
+      <p:sp>
+        <p:nvSpPr>
+          <p:cNvPr id="3" name="Content Placeholder 2"/>
+          <p:cNvSpPr>
+            <a:spLocks noGrp="1"/>
+          </p:cNvSpPr>
+          <p:nvPr>
+            <p:ph idx="1"/>
+          </p:nvPr>
+        </p:nvSpPr>
+        <p:spPr/>
+        <p:txBody>
+          <a:bodyPr/>
+          <a:lstStyle/>
+          <a:p>
+            <a:endParaRPr lang="sv-SE"/>
+          </a:p>
+        </p:txBody>
+      </p:sp>
+    </p:spTree>
+    <p:extLst>
+      <p:ext uri="{BB962C8B-B14F-4D97-AF65-F5344CB8AC3E}">
+        <p14:creationId xmlns:p14="http://schemas.microsoft.com/office/powerpoint/2010/main" val="3095243188"/>
+      </p:ext>
+    </p:extLst>
+  </p:cSld>
+  <p:clrMapOvr>
+    <a:masterClrMapping/>
+  </p:clrMapOvr>
+</p:sld>
+</file>
+
+<file path=ppt/slides/slide25.xml><?xml version="1.0" encoding="utf-8"?>
+<p:sld xmlns:a="http://schemas.openxmlformats.org/drawingml/2006/main" xmlns:r="http://schemas.openxmlformats.org/officeDocument/2006/relationships" xmlns:p="http://schemas.openxmlformats.org/presentationml/2006/main">
+  <p:cSld>
+    <p:spTree>
+      <p:nvGrpSpPr>
+        <p:cNvPr id="1" name=""/>
+        <p:cNvGrpSpPr/>
+        <p:nvPr/>
+      </p:nvGrpSpPr>
+      <p:grpSpPr>
+        <a:xfrm>
+          <a:off x="0" y="0"/>
+          <a:ext cx="0" cy="0"/>
+          <a:chOff x="0" y="0"/>
+          <a:chExt cx="0" cy="0"/>
+        </a:xfrm>
+      </p:grpSpPr>
+      <p:sp>
+        <p:nvSpPr>
+          <p:cNvPr id="4" name="Oval 3"/>
+          <p:cNvSpPr/>
+          <p:nvPr/>
+        </p:nvSpPr>
+        <p:spPr>
+          <a:xfrm>
+            <a:off x="3644721" y="2614411"/>
+            <a:ext cx="3618964" cy="1352282"/>
+          </a:xfrm>
+          <a:prstGeom prst="ellipse">
+            <a:avLst/>
+          </a:prstGeom>
+        </p:spPr>
+        <p:style>
+          <a:lnRef idx="2">
+            <a:schemeClr val="accent1">
+              <a:shade val="50000"/>
+            </a:schemeClr>
+          </a:lnRef>
+          <a:fillRef idx="1">
+            <a:schemeClr val="accent1"/>
+          </a:fillRef>
+          <a:effectRef idx="0">
+            <a:schemeClr val="accent1"/>
+          </a:effectRef>
+          <a:fontRef idx="minor">
+            <a:schemeClr val="lt1"/>
+          </a:fontRef>
+        </p:style>
+        <p:txBody>
+          <a:bodyPr rtlCol="0" anchor="ctr"/>
+          <a:lstStyle/>
+          <a:p>
+            <a:pPr algn="ctr"/>
+            <a:r>
+              <a:rPr lang="sv-SE" dirty="0"/>
+              <a:t>Lärande</a:t>
+            </a:r>
+          </a:p>
+        </p:txBody>
+      </p:sp>
+      <p:sp>
+        <p:nvSpPr>
+          <p:cNvPr id="5" name="Oval 4"/>
+          <p:cNvSpPr/>
+          <p:nvPr/>
+        </p:nvSpPr>
+        <p:spPr>
+          <a:xfrm>
+            <a:off x="7959144" y="1944710"/>
+            <a:ext cx="1519707" cy="759853"/>
+          </a:xfrm>
+          <a:prstGeom prst="ellipse">
+            <a:avLst/>
+          </a:prstGeom>
+        </p:spPr>
+        <p:style>
+          <a:lnRef idx="2">
+            <a:schemeClr val="accent1">
+              <a:shade val="50000"/>
+            </a:schemeClr>
+          </a:lnRef>
+          <a:fillRef idx="1">
+            <a:schemeClr val="accent1"/>
+          </a:fillRef>
+          <a:effectRef idx="0">
+            <a:schemeClr val="accent1"/>
+          </a:effectRef>
+          <a:fontRef idx="minor">
+            <a:schemeClr val="lt1"/>
+          </a:fontRef>
+        </p:style>
+        <p:txBody>
+          <a:bodyPr rtlCol="0" anchor="ctr"/>
+          <a:lstStyle/>
+          <a:p>
+            <a:pPr algn="ctr"/>
+            <a:r>
+              <a:rPr lang="sv-SE" dirty="0"/>
+              <a:t>Kognitiv förmåga</a:t>
+            </a:r>
+          </a:p>
+        </p:txBody>
+      </p:sp>
+      <p:sp>
+        <p:nvSpPr>
+          <p:cNvPr id="6" name="Oval 5"/>
+          <p:cNvSpPr/>
+          <p:nvPr/>
+        </p:nvSpPr>
+        <p:spPr>
+          <a:xfrm>
+            <a:off x="1970468" y="1738648"/>
+            <a:ext cx="1481070" cy="875763"/>
+          </a:xfrm>
+          <a:prstGeom prst="ellipse">
+            <a:avLst/>
+          </a:prstGeom>
+        </p:spPr>
+        <p:style>
+          <a:lnRef idx="2">
+            <a:schemeClr val="accent1">
+              <a:shade val="50000"/>
+            </a:schemeClr>
+          </a:lnRef>
+          <a:fillRef idx="1">
+            <a:schemeClr val="accent1"/>
+          </a:fillRef>
+          <a:effectRef idx="0">
+            <a:schemeClr val="accent1"/>
+          </a:effectRef>
+          <a:fontRef idx="minor">
+            <a:schemeClr val="lt1"/>
+          </a:fontRef>
+        </p:style>
+        <p:txBody>
+          <a:bodyPr rtlCol="0" anchor="ctr"/>
+          <a:lstStyle/>
+          <a:p>
+            <a:pPr algn="ctr"/>
+            <a:r>
+              <a:rPr lang="sv-SE" dirty="0"/>
+              <a:t>tekniker</a:t>
+            </a:r>
+          </a:p>
+        </p:txBody>
+      </p:sp>
+    </p:spTree>
+    <p:extLst>
+      <p:ext uri="{BB962C8B-B14F-4D97-AF65-F5344CB8AC3E}">
+        <p14:creationId xmlns:p14="http://schemas.microsoft.com/office/powerpoint/2010/main" val="1457663304"/>
+      </p:ext>
+    </p:extLst>
+  </p:cSld>
+  <p:clrMapOvr>
+    <a:masterClrMapping/>
+  </p:clrMapOvr>
+</p:sld>
+</file>
+
+<file path=ppt/slides/slide26.xml><?xml version="1.0" encoding="utf-8"?>
+<p:sld xmlns:a="http://schemas.openxmlformats.org/drawingml/2006/main" xmlns:r="http://schemas.openxmlformats.org/officeDocument/2006/relationships" xmlns:p="http://schemas.openxmlformats.org/presentationml/2006/main">
+  <p:cSld>
+    <p:spTree>
+      <p:nvGrpSpPr>
+        <p:cNvPr id="1" name=""/>
+        <p:cNvGrpSpPr/>
+        <p:nvPr/>
+      </p:nvGrpSpPr>
+      <p:grpSpPr>
+        <a:xfrm>
+          <a:off x="0" y="0"/>
+          <a:ext cx="0" cy="0"/>
+          <a:chOff x="0" y="0"/>
+          <a:chExt cx="0" cy="0"/>
+        </a:xfrm>
+      </p:grpSpPr>
+      <p:sp>
+        <p:nvSpPr>
+          <p:cNvPr id="2" name="Title 1"/>
+          <p:cNvSpPr>
+            <a:spLocks noGrp="1"/>
+          </p:cNvSpPr>
+          <p:nvPr>
+            <p:ph type="title"/>
+          </p:nvPr>
+        </p:nvSpPr>
+        <p:spPr/>
+        <p:txBody>
+          <a:bodyPr/>
+          <a:lstStyle/>
+          <a:p>
             <a:r>
               <a:rPr lang="sv-SE" dirty="0"/>
               <a:t>Tips i oordning</a:t>
@@ -13078,7 +13624,7 @@
 </p:sld>
 </file>
 
-<file path=ppt/slides/slide25.xml><?xml version="1.0" encoding="utf-8"?>
+<file path=ppt/slides/slide27.xml><?xml version="1.0" encoding="utf-8"?>
 <p:sld xmlns:a="http://schemas.openxmlformats.org/drawingml/2006/main" xmlns:r="http://schemas.openxmlformats.org/officeDocument/2006/relationships" xmlns:p="http://schemas.openxmlformats.org/presentationml/2006/main">
   <p:cSld>
     <p:spTree>

</xml_diff>